<commit_message>
LAST PRESENTATION LETS GOOOOO
</commit_message>
<xml_diff>
--- a/SprintPresentations/Presentation2.pptx
+++ b/SprintPresentations/Presentation2.pptx
@@ -14,6 +14,9 @@
     <p:sldId id="259" r:id="rId11"/>
     <p:sldId id="260" r:id="rId12"/>
     <p:sldId id="261" r:id="rId13"/>
+    <p:sldId id="262" r:id="rId14"/>
+    <p:sldId id="263" r:id="rId15"/>
+    <p:sldId id="264" r:id="rId16"/>
   </p:sldIdLst>
   <p:sldSz cx="13004800" cy="9753600"/>
   <p:notesSz cx="6858000" cy="9144000"/>
@@ -3294,7 +3297,7 @@
         </p:blipFill>
         <p:spPr>
           <a:xfrm>
-            <a:off x="8365230" y="3398653"/>
+            <a:off x="8060430" y="3538353"/>
             <a:ext cx="4969105" cy="4962894"/>
           </a:xfrm>
           <a:prstGeom prst="rect">
@@ -3615,6 +3618,287 @@
           </a:ln>
         </p:spPr>
       </p:pic>
+    </p:spTree>
+  </p:cSld>
+  <p:clrMapOvr>
+    <a:masterClrMapping/>
+  </p:clrMapOvr>
+  <p:transition xmlns:p14="http://schemas.microsoft.com/office/powerpoint/2010/main" spd="med" advClick="1"/>
+</p:sld>
+</file>
+
+<file path=ppt/slides/slide7.xml><?xml version="1.0" encoding="utf-8"?>
+<p:sld xmlns:a="http://schemas.openxmlformats.org/drawingml/2006/main" xmlns:r="http://schemas.openxmlformats.org/officeDocument/2006/relationships" xmlns:p="http://schemas.openxmlformats.org/presentationml/2006/main" showMasterSp="1" showMasterPhAnim="1">
+  <p:cSld>
+    <p:spTree>
+      <p:nvGrpSpPr>
+        <p:cNvPr id="1" name=""/>
+        <p:cNvGrpSpPr/>
+        <p:nvPr/>
+      </p:nvGrpSpPr>
+      <p:grpSpPr>
+        <a:xfrm>
+          <a:off x="0" y="0"/>
+          <a:ext cx="0" cy="0"/>
+          <a:chOff x="0" y="0"/>
+          <a:chExt cx="0" cy="0"/>
+        </a:xfrm>
+      </p:grpSpPr>
+      <p:sp>
+        <p:nvSpPr>
+          <p:cNvPr id="139" name="one more announcement…"/>
+          <p:cNvSpPr txBox="1"/>
+          <p:nvPr>
+            <p:ph type="title"/>
+          </p:nvPr>
+        </p:nvSpPr>
+        <p:spPr>
+          <a:prstGeom prst="rect">
+            <a:avLst/>
+          </a:prstGeom>
+        </p:spPr>
+        <p:txBody>
+          <a:bodyPr/>
+          <a:lstStyle/>
+          <a:p>
+            <a:pPr/>
+            <a:r>
+              <a:t>one more announcement…</a:t>
+            </a:r>
+          </a:p>
+        </p:txBody>
+      </p:sp>
+    </p:spTree>
+  </p:cSld>
+  <p:clrMapOvr>
+    <a:masterClrMapping/>
+  </p:clrMapOvr>
+  <p:transition xmlns:p14="http://schemas.microsoft.com/office/powerpoint/2010/main" spd="med" advClick="1"/>
+</p:sld>
+</file>
+
+<file path=ppt/slides/slide8.xml><?xml version="1.0" encoding="utf-8"?>
+<p:sld xmlns:a="http://schemas.openxmlformats.org/drawingml/2006/main" xmlns:r="http://schemas.openxmlformats.org/officeDocument/2006/relationships" xmlns:p="http://schemas.openxmlformats.org/presentationml/2006/main" showMasterSp="1" showMasterPhAnim="1">
+  <p:cSld>
+    <p:spTree>
+      <p:nvGrpSpPr>
+        <p:cNvPr id="1" name=""/>
+        <p:cNvGrpSpPr/>
+        <p:nvPr/>
+      </p:nvGrpSpPr>
+      <p:grpSpPr>
+        <a:xfrm>
+          <a:off x="0" y="0"/>
+          <a:ext cx="0" cy="0"/>
+          <a:chOff x="0" y="0"/>
+          <a:chExt cx="0" cy="0"/>
+        </a:xfrm>
+      </p:grpSpPr>
+      <p:sp>
+        <p:nvSpPr>
+          <p:cNvPr id="141" name="Coming q4 2018"/>
+          <p:cNvSpPr txBox="1"/>
+          <p:nvPr>
+            <p:ph type="title"/>
+          </p:nvPr>
+        </p:nvSpPr>
+        <p:spPr>
+          <a:prstGeom prst="rect">
+            <a:avLst/>
+          </a:prstGeom>
+        </p:spPr>
+        <p:txBody>
+          <a:bodyPr/>
+          <a:lstStyle/>
+          <a:p>
+            <a:pPr/>
+            <a:r>
+              <a:t>Coming q4 2018</a:t>
+            </a:r>
+          </a:p>
+        </p:txBody>
+      </p:sp>
+      <p:pic>
+        <p:nvPicPr>
+          <p:cNvPr id="142" name="foundersboxpng" descr="foundersboxpng"/>
+          <p:cNvPicPr>
+            <a:picLocks noChangeAspect="1"/>
+          </p:cNvPicPr>
+          <p:nvPr/>
+        </p:nvPicPr>
+        <p:blipFill>
+          <a:blip r:embed="rId2">
+            <a:extLst/>
+          </a:blip>
+          <a:stretch>
+            <a:fillRect/>
+          </a:stretch>
+        </p:blipFill>
+        <p:spPr>
+          <a:xfrm>
+            <a:off x="6070592" y="2628602"/>
+            <a:ext cx="5278313" cy="5721009"/>
+          </a:xfrm>
+          <a:prstGeom prst="rect">
+            <a:avLst/>
+          </a:prstGeom>
+          <a:ln w="12700">
+            <a:miter lim="400000"/>
+          </a:ln>
+        </p:spPr>
+      </p:pic>
+      <p:pic>
+        <p:nvPicPr>
+          <p:cNvPr id="143" name="36-500RE copy.png" descr="36-500RE copy.png"/>
+          <p:cNvPicPr>
+            <a:picLocks noChangeAspect="1"/>
+          </p:cNvPicPr>
+          <p:nvPr/>
+        </p:nvPicPr>
+        <p:blipFill>
+          <a:blip r:embed="rId3">
+            <a:extLst/>
+          </a:blip>
+          <a:stretch>
+            <a:fillRect/>
+          </a:stretch>
+        </p:blipFill>
+        <p:spPr>
+          <a:xfrm>
+            <a:off x="741957" y="4042109"/>
+            <a:ext cx="4641182" cy="4641182"/>
+          </a:xfrm>
+          <a:prstGeom prst="rect">
+            <a:avLst/>
+          </a:prstGeom>
+          <a:ln w="12700">
+            <a:miter lim="400000"/>
+          </a:ln>
+        </p:spPr>
+      </p:pic>
+      <p:pic>
+        <p:nvPicPr>
+          <p:cNvPr id="144" name="fidget-spinner-red-min_800x.png" descr="fidget-spinner-red-min_800x.png"/>
+          <p:cNvPicPr>
+            <a:picLocks noChangeAspect="1"/>
+          </p:cNvPicPr>
+          <p:nvPr/>
+        </p:nvPicPr>
+        <p:blipFill>
+          <a:blip r:embed="rId4">
+            <a:extLst/>
+          </a:blip>
+          <a:stretch>
+            <a:fillRect/>
+          </a:stretch>
+        </p:blipFill>
+        <p:spPr>
+          <a:xfrm>
+            <a:off x="3398339" y="5489184"/>
+            <a:ext cx="3080963" cy="3077111"/>
+          </a:xfrm>
+          <a:prstGeom prst="rect">
+            <a:avLst/>
+          </a:prstGeom>
+          <a:ln w="12700">
+            <a:miter lim="400000"/>
+          </a:ln>
+        </p:spPr>
+      </p:pic>
+      <p:sp>
+        <p:nvSpPr>
+          <p:cNvPr id="145" name="$299"/>
+          <p:cNvSpPr txBox="1"/>
+          <p:nvPr/>
+        </p:nvSpPr>
+        <p:spPr>
+          <a:xfrm>
+            <a:off x="3180850" y="3848099"/>
+            <a:ext cx="2655300" cy="1536701"/>
+          </a:xfrm>
+          <a:prstGeom prst="rect">
+            <a:avLst/>
+          </a:prstGeom>
+          <a:ln w="12700">
+            <a:miter lim="400000"/>
+          </a:ln>
+          <a:extLst>
+            <a:ext uri="{C572A759-6A51-4108-AA02-DFA0A04FC94B}">
+              <ma14:wrappingTextBoxFlag xmlns:ma14="http://schemas.microsoft.com/office/mac/drawingml/2011/main" val="1"/>
+            </a:ext>
+          </a:extLst>
+        </p:spPr>
+        <p:txBody>
+          <a:bodyPr wrap="none" lIns="50800" tIns="50800" rIns="50800" bIns="50800" anchor="ctr">
+            <a:spAutoFit/>
+          </a:bodyPr>
+          <a:lstStyle>
+            <a:lvl1pPr>
+              <a:defRPr sz="9900"/>
+            </a:lvl1pPr>
+          </a:lstStyle>
+          <a:p>
+            <a:pPr/>
+            <a:r>
+              <a:t>$299</a:t>
+            </a:r>
+          </a:p>
+        </p:txBody>
+      </p:sp>
+    </p:spTree>
+  </p:cSld>
+  <p:clrMapOvr>
+    <a:masterClrMapping/>
+  </p:clrMapOvr>
+  <p:transition xmlns:p14="http://schemas.microsoft.com/office/powerpoint/2010/main" spd="med" advClick="1"/>
+</p:sld>
+</file>
+
+<file path=ppt/slides/slide9.xml><?xml version="1.0" encoding="utf-8"?>
+<p:sld xmlns:a="http://schemas.openxmlformats.org/drawingml/2006/main" xmlns:r="http://schemas.openxmlformats.org/officeDocument/2006/relationships" xmlns:p="http://schemas.openxmlformats.org/presentationml/2006/main" showMasterSp="1" showMasterPhAnim="1">
+  <p:cSld>
+    <p:spTree>
+      <p:nvGrpSpPr>
+        <p:cNvPr id="1" name=""/>
+        <p:cNvGrpSpPr/>
+        <p:nvPr/>
+      </p:nvGrpSpPr>
+      <p:grpSpPr>
+        <a:xfrm>
+          <a:off x="0" y="0"/>
+          <a:ext cx="0" cy="0"/>
+          <a:chOff x="0" y="0"/>
+          <a:chExt cx="0" cy="0"/>
+        </a:xfrm>
+      </p:grpSpPr>
+      <p:sp>
+        <p:nvSpPr>
+          <p:cNvPr id="147" name="We are accepting pre-orders Today"/>
+          <p:cNvSpPr txBox="1"/>
+          <p:nvPr>
+            <p:ph type="title"/>
+          </p:nvPr>
+        </p:nvSpPr>
+        <p:spPr>
+          <a:prstGeom prst="rect">
+            <a:avLst/>
+          </a:prstGeom>
+        </p:spPr>
+        <p:txBody>
+          <a:bodyPr/>
+          <a:lstStyle>
+            <a:lvl1pPr>
+              <a:defRPr sz="6500"/>
+            </a:lvl1pPr>
+          </a:lstStyle>
+          <a:p>
+            <a:pPr/>
+            <a:r>
+              <a:t>We are accepting pre-orders Today</a:t>
+            </a:r>
+          </a:p>
+        </p:txBody>
+      </p:sp>
     </p:spTree>
   </p:cSld>
   <p:clrMapOvr>

</xml_diff>